<commit_message>
docs(minutes): update English version and make up
</commit_message>
<xml_diff>
--- a/Design/helpPic2.pptx
+++ b/Design/helpPic2.pptx
@@ -8,7 +8,8 @@
     <p:sldId id="256" r:id="rId2"/>
     <p:sldId id="260" r:id="rId3"/>
     <p:sldId id="261" r:id="rId4"/>
-    <p:sldId id="259" r:id="rId5"/>
+    <p:sldId id="262" r:id="rId5"/>
+    <p:sldId id="259" r:id="rId6"/>
   </p:sldIdLst>
   <p:sldSz cx="12192000" cy="6858000"/>
   <p:notesSz cx="6858000" cy="9144000"/>
@@ -262,7 +263,7 @@
           <a:p>
             <a:fld id="{0F77A61D-ED78-45A2-B3D6-4E0CC86C1CF5}" type="datetimeFigureOut">
               <a:rPr lang="zh-CN" altLang="en-US" smtClean="0"/>
-              <a:t>2021/3/14</a:t>
+              <a:t>21/3/16</a:t>
             </a:fld>
             <a:endParaRPr lang="zh-CN" altLang="en-US"/>
           </a:p>
@@ -460,7 +461,7 @@
           <a:p>
             <a:fld id="{0F77A61D-ED78-45A2-B3D6-4E0CC86C1CF5}" type="datetimeFigureOut">
               <a:rPr lang="zh-CN" altLang="en-US" smtClean="0"/>
-              <a:t>2021/3/14</a:t>
+              <a:t>21/3/16</a:t>
             </a:fld>
             <a:endParaRPr lang="zh-CN" altLang="en-US"/>
           </a:p>
@@ -668,7 +669,7 @@
           <a:p>
             <a:fld id="{0F77A61D-ED78-45A2-B3D6-4E0CC86C1CF5}" type="datetimeFigureOut">
               <a:rPr lang="zh-CN" altLang="en-US" smtClean="0"/>
-              <a:t>2021/3/14</a:t>
+              <a:t>21/3/16</a:t>
             </a:fld>
             <a:endParaRPr lang="zh-CN" altLang="en-US"/>
           </a:p>
@@ -866,7 +867,7 @@
           <a:p>
             <a:fld id="{0F77A61D-ED78-45A2-B3D6-4E0CC86C1CF5}" type="datetimeFigureOut">
               <a:rPr lang="zh-CN" altLang="en-US" smtClean="0"/>
-              <a:t>2021/3/14</a:t>
+              <a:t>21/3/16</a:t>
             </a:fld>
             <a:endParaRPr lang="zh-CN" altLang="en-US"/>
           </a:p>
@@ -1141,7 +1142,7 @@
           <a:p>
             <a:fld id="{0F77A61D-ED78-45A2-B3D6-4E0CC86C1CF5}" type="datetimeFigureOut">
               <a:rPr lang="zh-CN" altLang="en-US" smtClean="0"/>
-              <a:t>2021/3/14</a:t>
+              <a:t>21/3/16</a:t>
             </a:fld>
             <a:endParaRPr lang="zh-CN" altLang="en-US"/>
           </a:p>
@@ -1406,7 +1407,7 @@
           <a:p>
             <a:fld id="{0F77A61D-ED78-45A2-B3D6-4E0CC86C1CF5}" type="datetimeFigureOut">
               <a:rPr lang="zh-CN" altLang="en-US" smtClean="0"/>
-              <a:t>2021/3/14</a:t>
+              <a:t>21/3/16</a:t>
             </a:fld>
             <a:endParaRPr lang="zh-CN" altLang="en-US"/>
           </a:p>
@@ -1818,7 +1819,7 @@
           <a:p>
             <a:fld id="{0F77A61D-ED78-45A2-B3D6-4E0CC86C1CF5}" type="datetimeFigureOut">
               <a:rPr lang="zh-CN" altLang="en-US" smtClean="0"/>
-              <a:t>2021/3/14</a:t>
+              <a:t>21/3/16</a:t>
             </a:fld>
             <a:endParaRPr lang="zh-CN" altLang="en-US"/>
           </a:p>
@@ -1959,7 +1960,7 @@
           <a:p>
             <a:fld id="{0F77A61D-ED78-45A2-B3D6-4E0CC86C1CF5}" type="datetimeFigureOut">
               <a:rPr lang="zh-CN" altLang="en-US" smtClean="0"/>
-              <a:t>2021/3/14</a:t>
+              <a:t>21/3/16</a:t>
             </a:fld>
             <a:endParaRPr lang="zh-CN" altLang="en-US"/>
           </a:p>
@@ -2072,7 +2073,7 @@
           <a:p>
             <a:fld id="{0F77A61D-ED78-45A2-B3D6-4E0CC86C1CF5}" type="datetimeFigureOut">
               <a:rPr lang="zh-CN" altLang="en-US" smtClean="0"/>
-              <a:t>2021/3/14</a:t>
+              <a:t>21/3/16</a:t>
             </a:fld>
             <a:endParaRPr lang="zh-CN" altLang="en-US"/>
           </a:p>
@@ -2383,7 +2384,7 @@
           <a:p>
             <a:fld id="{0F77A61D-ED78-45A2-B3D6-4E0CC86C1CF5}" type="datetimeFigureOut">
               <a:rPr lang="zh-CN" altLang="en-US" smtClean="0"/>
-              <a:t>2021/3/14</a:t>
+              <a:t>21/3/16</a:t>
             </a:fld>
             <a:endParaRPr lang="zh-CN" altLang="en-US"/>
           </a:p>
@@ -2671,7 +2672,7 @@
           <a:p>
             <a:fld id="{0F77A61D-ED78-45A2-B3D6-4E0CC86C1CF5}" type="datetimeFigureOut">
               <a:rPr lang="zh-CN" altLang="en-US" smtClean="0"/>
-              <a:t>2021/3/14</a:t>
+              <a:t>21/3/16</a:t>
             </a:fld>
             <a:endParaRPr lang="zh-CN" altLang="en-US"/>
           </a:p>
@@ -2912,7 +2913,7 @@
           <a:p>
             <a:fld id="{0F77A61D-ED78-45A2-B3D6-4E0CC86C1CF5}" type="datetimeFigureOut">
               <a:rPr lang="zh-CN" altLang="en-US" smtClean="0"/>
-              <a:t>2021/3/14</a:t>
+              <a:t>21/3/16</a:t>
             </a:fld>
             <a:endParaRPr lang="zh-CN" altLang="en-US"/>
           </a:p>
@@ -5358,10 +5359,10 @@
       </p:grpSpPr>
       <p:pic>
         <p:nvPicPr>
-          <p:cNvPr id="3" name="图片 2" descr="图标&#10;&#10;描述已自动生成">
-            <a:extLst>
-              <a:ext uri="{FF2B5EF4-FFF2-40B4-BE49-F238E27FC236}">
-                <a16:creationId xmlns:a16="http://schemas.microsoft.com/office/drawing/2014/main" id="{802DF59B-CF23-6149-8941-7E0E012A0D02}"/>
+          <p:cNvPr id="5" name="Picture 4">
+            <a:extLst>
+              <a:ext uri="{FF2B5EF4-FFF2-40B4-BE49-F238E27FC236}">
+                <a16:creationId xmlns:a16="http://schemas.microsoft.com/office/drawing/2014/main" id="{237D8588-E8A0-4677-A2FE-6BB016BFAAA9}"/>
               </a:ext>
             </a:extLst>
           </p:cNvPr>
@@ -5371,21 +5372,15 @@
           <p:nvPr/>
         </p:nvPicPr>
         <p:blipFill>
-          <a:blip r:embed="rId2">
-            <a:extLst>
-              <a:ext uri="{28A0092B-C50C-407E-A947-70E740481C1C}">
-                <a14:useLocalDpi xmlns:a14="http://schemas.microsoft.com/office/drawing/2010/main" val="0"/>
-              </a:ext>
-            </a:extLst>
-          </a:blip>
+          <a:blip r:embed="rId2"/>
           <a:stretch>
             <a:fillRect/>
           </a:stretch>
         </p:blipFill>
         <p:spPr>
           <a:xfrm>
-            <a:off x="1688511" y="489075"/>
-            <a:ext cx="2120325" cy="2068187"/>
+            <a:off x="1820264" y="575402"/>
+            <a:ext cx="1899645" cy="1905216"/>
           </a:xfrm>
           <a:prstGeom prst="rect">
             <a:avLst/>
@@ -5449,191 +5444,6 @@
           </a:p>
         </p:txBody>
       </p:sp>
-      <p:pic>
-        <p:nvPicPr>
-          <p:cNvPr id="26" name="图片 25">
-            <a:extLst>
-              <a:ext uri="{FF2B5EF4-FFF2-40B4-BE49-F238E27FC236}">
-                <a16:creationId xmlns:a16="http://schemas.microsoft.com/office/drawing/2014/main" id="{27BBF39F-28BC-4CBA-A1E1-BE2EE88DF537}"/>
-              </a:ext>
-            </a:extLst>
-          </p:cNvPr>
-          <p:cNvPicPr/>
-          <p:nvPr/>
-        </p:nvPicPr>
-        <p:blipFill>
-          <a:blip r:embed="rId3">
-            <a:extLst>
-              <a:ext uri="{28A0092B-C50C-407E-A947-70E740481C1C}">
-                <a14:useLocalDpi xmlns:a14="http://schemas.microsoft.com/office/drawing/2010/main" val="0"/>
-              </a:ext>
-            </a:extLst>
-          </a:blip>
-          <a:srcRect/>
-          <a:stretch>
-            <a:fillRect/>
-          </a:stretch>
-        </p:blipFill>
-        <p:spPr bwMode="auto">
-          <a:xfrm>
-            <a:off x="8200629" y="1133816"/>
-            <a:ext cx="803855" cy="722808"/>
-          </a:xfrm>
-          <a:prstGeom prst="rect">
-            <a:avLst/>
-          </a:prstGeom>
-          <a:noFill/>
-          <a:ln>
-            <a:noFill/>
-          </a:ln>
-        </p:spPr>
-      </p:pic>
-      <p:sp>
-        <p:nvSpPr>
-          <p:cNvPr id="27" name="流程图: 接点 26">
-            <a:extLst>
-              <a:ext uri="{FF2B5EF4-FFF2-40B4-BE49-F238E27FC236}">
-                <a16:creationId xmlns:a16="http://schemas.microsoft.com/office/drawing/2014/main" id="{F36BE852-147B-40FC-8C13-FA71F87077A4}"/>
-              </a:ext>
-            </a:extLst>
-          </p:cNvPr>
-          <p:cNvSpPr/>
-          <p:nvPr/>
-        </p:nvSpPr>
-        <p:spPr>
-          <a:xfrm>
-            <a:off x="8257977" y="1152181"/>
-            <a:ext cx="662940" cy="659196"/>
-          </a:xfrm>
-          <a:prstGeom prst="flowChartConnector">
-            <a:avLst/>
-          </a:prstGeom>
-          <a:solidFill>
-            <a:schemeClr val="accent3">
-              <a:alpha val="50000"/>
-            </a:schemeClr>
-          </a:solidFill>
-          <a:ln>
-            <a:noFill/>
-          </a:ln>
-        </p:spPr>
-        <p:style>
-          <a:lnRef idx="0">
-            <a:scrgbClr r="0" g="0" b="0"/>
-          </a:lnRef>
-          <a:fillRef idx="0">
-            <a:scrgbClr r="0" g="0" b="0"/>
-          </a:fillRef>
-          <a:effectRef idx="0">
-            <a:scrgbClr r="0" g="0" b="0"/>
-          </a:effectRef>
-          <a:fontRef idx="minor">
-            <a:schemeClr val="lt1"/>
-          </a:fontRef>
-        </p:style>
-        <p:txBody>
-          <a:bodyPr rot="0" spcFirstLastPara="0" vert="horz" wrap="square" lIns="91440" tIns="45720" rIns="91440" bIns="45720" numCol="1" spcCol="0" rtlCol="0" fromWordArt="0" anchor="ctr" anchorCtr="0" forceAA="0" compatLnSpc="1">
-            <a:prstTxWarp prst="textNoShape">
-              <a:avLst/>
-            </a:prstTxWarp>
-            <a:noAutofit/>
-          </a:bodyPr>
-          <a:lstStyle/>
-          <a:p>
-            <a:endParaRPr lang="zh-CN" altLang="en-US" dirty="0"/>
-          </a:p>
-        </p:txBody>
-      </p:sp>
-      <p:pic>
-        <p:nvPicPr>
-          <p:cNvPr id="28" name="图片 27" descr="卡通人物&#10;&#10;中度可信度描述已自动生成">
-            <a:extLst>
-              <a:ext uri="{FF2B5EF4-FFF2-40B4-BE49-F238E27FC236}">
-                <a16:creationId xmlns:a16="http://schemas.microsoft.com/office/drawing/2014/main" id="{AD3D24E3-C764-4DD5-9E32-567F9870499A}"/>
-              </a:ext>
-            </a:extLst>
-          </p:cNvPr>
-          <p:cNvPicPr/>
-          <p:nvPr/>
-        </p:nvPicPr>
-        <p:blipFill>
-          <a:blip r:embed="rId4">
-            <a:extLst>
-              <a:ext uri="{28A0092B-C50C-407E-A947-70E740481C1C}">
-                <a14:useLocalDpi xmlns:a14="http://schemas.microsoft.com/office/drawing/2010/main" val="0"/>
-              </a:ext>
-            </a:extLst>
-          </a:blip>
-          <a:stretch>
-            <a:fillRect/>
-          </a:stretch>
-        </p:blipFill>
-        <p:spPr>
-          <a:xfrm>
-            <a:off x="5430231" y="1133816"/>
-            <a:ext cx="1002786" cy="777240"/>
-          </a:xfrm>
-          <a:prstGeom prst="rect">
-            <a:avLst/>
-          </a:prstGeom>
-        </p:spPr>
-      </p:pic>
-      <p:sp>
-        <p:nvSpPr>
-          <p:cNvPr id="29" name="流程图: 接点 28">
-            <a:extLst>
-              <a:ext uri="{FF2B5EF4-FFF2-40B4-BE49-F238E27FC236}">
-                <a16:creationId xmlns:a16="http://schemas.microsoft.com/office/drawing/2014/main" id="{9D8B6CE5-4443-4C5B-8CEF-C34CD2075BFD}"/>
-              </a:ext>
-            </a:extLst>
-          </p:cNvPr>
-          <p:cNvSpPr/>
-          <p:nvPr/>
-        </p:nvSpPr>
-        <p:spPr>
-          <a:xfrm>
-            <a:off x="5607001" y="1169251"/>
-            <a:ext cx="662940" cy="642126"/>
-          </a:xfrm>
-          <a:prstGeom prst="flowChartConnector">
-            <a:avLst/>
-          </a:prstGeom>
-          <a:solidFill>
-            <a:schemeClr val="accent3">
-              <a:alpha val="50000"/>
-            </a:schemeClr>
-          </a:solidFill>
-          <a:ln>
-            <a:noFill/>
-          </a:ln>
-        </p:spPr>
-        <p:style>
-          <a:lnRef idx="0">
-            <a:scrgbClr r="0" g="0" b="0"/>
-          </a:lnRef>
-          <a:fillRef idx="0">
-            <a:scrgbClr r="0" g="0" b="0"/>
-          </a:fillRef>
-          <a:effectRef idx="0">
-            <a:scrgbClr r="0" g="0" b="0"/>
-          </a:effectRef>
-          <a:fontRef idx="minor">
-            <a:schemeClr val="lt1"/>
-          </a:fontRef>
-        </p:style>
-        <p:txBody>
-          <a:bodyPr rot="0" spcFirstLastPara="0" vert="horz" wrap="square" lIns="91440" tIns="45720" rIns="91440" bIns="45720" numCol="1" spcCol="0" rtlCol="0" fromWordArt="0" anchor="ctr" anchorCtr="0" forceAA="0" compatLnSpc="1">
-            <a:prstTxWarp prst="textNoShape">
-              <a:avLst/>
-            </a:prstTxWarp>
-            <a:noAutofit/>
-          </a:bodyPr>
-          <a:lstStyle/>
-          <a:p>
-            <a:endParaRPr lang="zh-CN" altLang="en-US" dirty="0"/>
-          </a:p>
-        </p:txBody>
-      </p:sp>
       <p:sp>
         <p:nvSpPr>
           <p:cNvPr id="54" name="矩形: 圆角 53">
@@ -5655,11 +5465,11 @@
             <a:avLst/>
           </a:prstGeom>
           <a:solidFill>
-            <a:srgbClr val="1565C0"/>
+            <a:srgbClr val="4CB050"/>
           </a:solidFill>
           <a:ln>
             <a:solidFill>
-              <a:srgbClr val="1565C0"/>
+              <a:srgbClr val="4CB050"/>
             </a:solidFill>
           </a:ln>
         </p:spPr>
@@ -5729,11 +5539,11 @@
             <a:avLst/>
           </a:prstGeom>
           <a:solidFill>
-            <a:srgbClr val="1565C0"/>
+            <a:srgbClr val="4CB050"/>
           </a:solidFill>
           <a:ln>
             <a:solidFill>
-              <a:srgbClr val="1565C0"/>
+              <a:srgbClr val="4CB050"/>
             </a:solidFill>
           </a:ln>
         </p:spPr>
@@ -5802,11 +5612,11 @@
             <a:avLst/>
           </a:prstGeom>
           <a:solidFill>
-            <a:srgbClr val="1565C0"/>
+            <a:srgbClr val="4CB050"/>
           </a:solidFill>
           <a:ln>
             <a:solidFill>
-              <a:srgbClr val="1565C0"/>
+              <a:srgbClr val="4CB050"/>
             </a:solidFill>
           </a:ln>
         </p:spPr>
@@ -6057,6 +5867,11 @@
           <a:prstGeom prst="line">
             <a:avLst/>
           </a:prstGeom>
+          <a:ln>
+            <a:solidFill>
+              <a:srgbClr val="4CB050"/>
+            </a:solidFill>
+          </a:ln>
         </p:spPr>
         <p:style>
           <a:lnRef idx="1">
@@ -6096,6 +5911,11 @@
           <a:prstGeom prst="line">
             <a:avLst/>
           </a:prstGeom>
+          <a:ln>
+            <a:solidFill>
+              <a:srgbClr val="4CB050"/>
+            </a:solidFill>
+          </a:ln>
         </p:spPr>
         <p:style>
           <a:lnRef idx="1">
@@ -6132,45 +5952,11 @@
           <a:prstGeom prst="line">
             <a:avLst/>
           </a:prstGeom>
-        </p:spPr>
-        <p:style>
-          <a:lnRef idx="1">
-            <a:schemeClr val="accent1"/>
-          </a:lnRef>
-          <a:fillRef idx="0">
-            <a:schemeClr val="accent1"/>
-          </a:fillRef>
-          <a:effectRef idx="0">
-            <a:schemeClr val="accent1"/>
-          </a:effectRef>
-          <a:fontRef idx="minor">
-            <a:schemeClr val="tx1"/>
-          </a:fontRef>
-        </p:style>
-      </p:cxnSp>
-      <p:cxnSp>
-        <p:nvCxnSpPr>
-          <p:cNvPr id="80" name="直接连接符 79">
-            <a:extLst>
-              <a:ext uri="{FF2B5EF4-FFF2-40B4-BE49-F238E27FC236}">
-                <a16:creationId xmlns:a16="http://schemas.microsoft.com/office/drawing/2014/main" id="{02523D7A-533C-43D9-B6BA-AE72135FA8CB}"/>
-              </a:ext>
-            </a:extLst>
-          </p:cNvPr>
-          <p:cNvCxnSpPr>
-            <a:stCxn id="68" idx="1"/>
-            <a:endCxn id="29" idx="6"/>
-          </p:cNvCxnSpPr>
-          <p:nvPr/>
-        </p:nvCxnSpPr>
-        <p:spPr>
-          <a:xfrm flipH="1">
-            <a:off x="6269941" y="1392160"/>
-            <a:ext cx="220424" cy="98154"/>
-          </a:xfrm>
-          <a:prstGeom prst="line">
-            <a:avLst/>
-          </a:prstGeom>
+          <a:ln>
+            <a:solidFill>
+              <a:srgbClr val="4CB050"/>
+            </a:solidFill>
+          </a:ln>
         </p:spPr>
         <p:style>
           <a:lnRef idx="1">
@@ -6284,7 +6070,7 @@
           <p:nvPr/>
         </p:nvPicPr>
         <p:blipFill>
-          <a:blip r:embed="rId5">
+          <a:blip r:embed="rId3">
             <a:extLst>
               <a:ext uri="{28A0092B-C50C-407E-A947-70E740481C1C}">
                 <a14:useLocalDpi xmlns:a14="http://schemas.microsoft.com/office/drawing/2010/main" val="0"/>
@@ -6299,6 +6085,105 @@
           <a:xfrm>
             <a:off x="468351" y="3710721"/>
             <a:ext cx="6738257" cy="780296"/>
+          </a:xfrm>
+          <a:prstGeom prst="rect">
+            <a:avLst/>
+          </a:prstGeom>
+        </p:spPr>
+      </p:pic>
+      <p:pic>
+        <p:nvPicPr>
+          <p:cNvPr id="4" name="Picture 3">
+            <a:extLst>
+              <a:ext uri="{FF2B5EF4-FFF2-40B4-BE49-F238E27FC236}">
+                <a16:creationId xmlns:a16="http://schemas.microsoft.com/office/drawing/2014/main" id="{A8D7FCF5-C881-4568-8FFF-C9CFFE86BB8F}"/>
+              </a:ext>
+            </a:extLst>
+          </p:cNvPr>
+          <p:cNvPicPr>
+            <a:picLocks noChangeAspect="1"/>
+          </p:cNvPicPr>
+          <p:nvPr/>
+        </p:nvPicPr>
+        <p:blipFill>
+          <a:blip r:embed="rId4"/>
+          <a:stretch>
+            <a:fillRect/>
+          </a:stretch>
+        </p:blipFill>
+        <p:spPr>
+          <a:xfrm>
+            <a:off x="5579160" y="1199399"/>
+            <a:ext cx="685800" cy="657225"/>
+          </a:xfrm>
+          <a:prstGeom prst="rect">
+            <a:avLst/>
+          </a:prstGeom>
+        </p:spPr>
+      </p:pic>
+      <p:cxnSp>
+        <p:nvCxnSpPr>
+          <p:cNvPr id="80" name="直接连接符 79">
+            <a:extLst>
+              <a:ext uri="{FF2B5EF4-FFF2-40B4-BE49-F238E27FC236}">
+                <a16:creationId xmlns:a16="http://schemas.microsoft.com/office/drawing/2014/main" id="{02523D7A-533C-43D9-B6BA-AE72135FA8CB}"/>
+              </a:ext>
+            </a:extLst>
+          </p:cNvPr>
+          <p:cNvCxnSpPr>
+            <a:cxnSpLocks/>
+            <a:stCxn id="68" idx="1"/>
+          </p:cNvCxnSpPr>
+          <p:nvPr/>
+        </p:nvCxnSpPr>
+        <p:spPr>
+          <a:xfrm flipH="1">
+            <a:off x="6145731" y="1392160"/>
+            <a:ext cx="344634" cy="125953"/>
+          </a:xfrm>
+          <a:prstGeom prst="line">
+            <a:avLst/>
+          </a:prstGeom>
+        </p:spPr>
+        <p:style>
+          <a:lnRef idx="1">
+            <a:schemeClr val="accent1"/>
+          </a:lnRef>
+          <a:fillRef idx="0">
+            <a:schemeClr val="accent1"/>
+          </a:fillRef>
+          <a:effectRef idx="0">
+            <a:schemeClr val="accent1"/>
+          </a:effectRef>
+          <a:fontRef idx="minor">
+            <a:schemeClr val="tx1"/>
+          </a:fontRef>
+        </p:style>
+      </p:cxnSp>
+      <p:pic>
+        <p:nvPicPr>
+          <p:cNvPr id="10" name="Picture 9">
+            <a:extLst>
+              <a:ext uri="{FF2B5EF4-FFF2-40B4-BE49-F238E27FC236}">
+                <a16:creationId xmlns:a16="http://schemas.microsoft.com/office/drawing/2014/main" id="{003116F8-2180-4024-B169-675E483B7207}"/>
+              </a:ext>
+            </a:extLst>
+          </p:cNvPr>
+          <p:cNvPicPr>
+            <a:picLocks noChangeAspect="1"/>
+          </p:cNvPicPr>
+          <p:nvPr/>
+        </p:nvPicPr>
+        <p:blipFill>
+          <a:blip r:embed="rId5"/>
+          <a:stretch>
+            <a:fillRect/>
+          </a:stretch>
+        </p:blipFill>
+        <p:spPr>
+          <a:xfrm>
+            <a:off x="8389621" y="1247023"/>
+            <a:ext cx="552450" cy="561975"/>
           </a:xfrm>
           <a:prstGeom prst="rect">
             <a:avLst/>
@@ -6319,6 +6204,875 @@
 </file>
 
 <file path=ppt/slides/slide4.xml><?xml version="1.0" encoding="utf-8"?>
+<p:sld xmlns:a="http://schemas.openxmlformats.org/drawingml/2006/main" xmlns:r="http://schemas.openxmlformats.org/officeDocument/2006/relationships" xmlns:p="http://schemas.openxmlformats.org/presentationml/2006/main">
+  <p:cSld>
+    <p:spTree>
+      <p:nvGrpSpPr>
+        <p:cNvPr id="1" name=""/>
+        <p:cNvGrpSpPr/>
+        <p:nvPr/>
+      </p:nvGrpSpPr>
+      <p:grpSpPr>
+        <a:xfrm>
+          <a:off x="0" y="0"/>
+          <a:ext cx="0" cy="0"/>
+          <a:chOff x="0" y="0"/>
+          <a:chExt cx="0" cy="0"/>
+        </a:xfrm>
+      </p:grpSpPr>
+      <p:pic>
+        <p:nvPicPr>
+          <p:cNvPr id="3" name="Picture 2">
+            <a:extLst>
+              <a:ext uri="{FF2B5EF4-FFF2-40B4-BE49-F238E27FC236}">
+                <a16:creationId xmlns:a16="http://schemas.microsoft.com/office/drawing/2014/main" id="{86396AB0-112A-4CEC-8042-6FA6F2C43D8E}"/>
+              </a:ext>
+            </a:extLst>
+          </p:cNvPr>
+          <p:cNvPicPr>
+            <a:picLocks noChangeAspect="1"/>
+          </p:cNvPicPr>
+          <p:nvPr/>
+        </p:nvPicPr>
+        <p:blipFill>
+          <a:blip r:embed="rId2"/>
+          <a:stretch>
+            <a:fillRect/>
+          </a:stretch>
+        </p:blipFill>
+        <p:spPr>
+          <a:xfrm>
+            <a:off x="1849274" y="906891"/>
+            <a:ext cx="1508735" cy="1548967"/>
+          </a:xfrm>
+          <a:prstGeom prst="rect">
+            <a:avLst/>
+          </a:prstGeom>
+        </p:spPr>
+      </p:pic>
+      <p:sp>
+        <p:nvSpPr>
+          <p:cNvPr id="11" name="文本框 29">
+            <a:extLst>
+              <a:ext uri="{FF2B5EF4-FFF2-40B4-BE49-F238E27FC236}">
+                <a16:creationId xmlns:a16="http://schemas.microsoft.com/office/drawing/2014/main" id="{005C1975-8FFC-48B3-AC1D-77C9B7FEFA00}"/>
+              </a:ext>
+            </a:extLst>
+          </p:cNvPr>
+          <p:cNvSpPr txBox="1"/>
+          <p:nvPr/>
+        </p:nvSpPr>
+        <p:spPr>
+          <a:xfrm>
+            <a:off x="8069581" y="13867"/>
+            <a:ext cx="320040" cy="548640"/>
+          </a:xfrm>
+          <a:prstGeom prst="rect">
+            <a:avLst/>
+          </a:prstGeom>
+          <a:noFill/>
+          <a:ln>
+            <a:noFill/>
+          </a:ln>
+          <a:effectLst/>
+        </p:spPr>
+        <p:txBody>
+          <a:bodyPr rot="0" spcFirstLastPara="0" vert="horz" wrap="square" lIns="91440" tIns="45720" rIns="91440" bIns="45720" numCol="1" spcCol="0" rtlCol="0" fromWordArt="0" anchor="t" anchorCtr="0" forceAA="0" compatLnSpc="1">
+            <a:prstTxWarp prst="textNoShape">
+              <a:avLst/>
+            </a:prstTxWarp>
+            <a:noAutofit/>
+          </a:bodyPr>
+          <a:lstStyle/>
+          <a:p>
+            <a:pPr algn="just"/>
+            <a:r>
+              <a:rPr lang="en-US" sz="2200" kern="100">
+                <a:solidFill>
+                  <a:srgbClr val="FFFFFF"/>
+                </a:solidFill>
+                <a:effectLst/>
+                <a:latin typeface="Calibri" panose="020F0502020204030204" pitchFamily="34" charset="0"/>
+                <a:ea typeface="宋体" panose="02010600030101010101" pitchFamily="2" charset="-122"/>
+                <a:cs typeface="Times New Roman" panose="02020603050405020304" pitchFamily="18" charset="0"/>
+              </a:rPr>
+              <a:t>2</a:t>
+            </a:r>
+            <a:endParaRPr lang="zh-CN" sz="1050" kern="100">
+              <a:effectLst/>
+              <a:latin typeface="Calibri" panose="020F0502020204030204" pitchFamily="34" charset="0"/>
+              <a:ea typeface="宋体" panose="02010600030101010101" pitchFamily="2" charset="-122"/>
+              <a:cs typeface="Times New Roman" panose="02020603050405020304" pitchFamily="18" charset="0"/>
+            </a:endParaRPr>
+          </a:p>
+        </p:txBody>
+      </p:sp>
+      <p:sp>
+        <p:nvSpPr>
+          <p:cNvPr id="54" name="矩形: 圆角 53">
+            <a:extLst>
+              <a:ext uri="{FF2B5EF4-FFF2-40B4-BE49-F238E27FC236}">
+                <a16:creationId xmlns:a16="http://schemas.microsoft.com/office/drawing/2014/main" id="{52AF139D-B61B-475F-B39D-552216393701}"/>
+              </a:ext>
+            </a:extLst>
+          </p:cNvPr>
+          <p:cNvSpPr/>
+          <p:nvPr/>
+        </p:nvSpPr>
+        <p:spPr>
+          <a:xfrm>
+            <a:off x="372305" y="543435"/>
+            <a:ext cx="1075605" cy="532038"/>
+          </a:xfrm>
+          <a:prstGeom prst="roundRect">
+            <a:avLst/>
+          </a:prstGeom>
+          <a:solidFill>
+            <a:srgbClr val="FF6F00"/>
+          </a:solidFill>
+          <a:ln>
+            <a:solidFill>
+              <a:srgbClr val="FF6F00"/>
+            </a:solidFill>
+          </a:ln>
+        </p:spPr>
+        <p:style>
+          <a:lnRef idx="2">
+            <a:schemeClr val="accent1">
+              <a:shade val="50000"/>
+            </a:schemeClr>
+          </a:lnRef>
+          <a:fillRef idx="1">
+            <a:schemeClr val="accent1"/>
+          </a:fillRef>
+          <a:effectRef idx="0">
+            <a:schemeClr val="accent1"/>
+          </a:effectRef>
+          <a:fontRef idx="minor">
+            <a:schemeClr val="lt1"/>
+          </a:fontRef>
+        </p:style>
+        <p:txBody>
+          <a:bodyPr rtlCol="0" anchor="ctr"/>
+          <a:lstStyle/>
+          <a:p>
+            <a:pPr algn="ctr"/>
+            <a:r>
+              <a:rPr lang="en-US" altLang="zh-CN" sz="1400" kern="100" dirty="0">
+                <a:solidFill>
+                  <a:schemeClr val="bg1"/>
+                </a:solidFill>
+                <a:effectLst/>
+                <a:latin typeface="Quicksand" pitchFamily="2" charset="0"/>
+                <a:ea typeface="宋体" panose="02010600030101010101" pitchFamily="2" charset="-122"/>
+                <a:cs typeface="Arial" panose="020B0604020202020204" pitchFamily="34" charset="0"/>
+              </a:rPr>
+              <a:t>Last Visit Border</a:t>
+            </a:r>
+            <a:endParaRPr lang="zh-CN" altLang="zh-CN" sz="1400" kern="100" dirty="0">
+              <a:solidFill>
+                <a:schemeClr val="bg1"/>
+              </a:solidFill>
+              <a:effectLst/>
+              <a:latin typeface="Quicksand" pitchFamily="2" charset="0"/>
+              <a:ea typeface="宋体" panose="02010600030101010101" pitchFamily="2" charset="-122"/>
+              <a:cs typeface="Arial" panose="020B0604020202020204" pitchFamily="34" charset="0"/>
+            </a:endParaRPr>
+          </a:p>
+        </p:txBody>
+      </p:sp>
+      <p:sp>
+        <p:nvSpPr>
+          <p:cNvPr id="59" name="矩形: 圆角 58">
+            <a:extLst>
+              <a:ext uri="{FF2B5EF4-FFF2-40B4-BE49-F238E27FC236}">
+                <a16:creationId xmlns:a16="http://schemas.microsoft.com/office/drawing/2014/main" id="{84155CFD-1B90-4CFF-B8C8-8887E7336BBC}"/>
+              </a:ext>
+            </a:extLst>
+          </p:cNvPr>
+          <p:cNvSpPr/>
+          <p:nvPr/>
+        </p:nvSpPr>
+        <p:spPr>
+          <a:xfrm>
+            <a:off x="468351" y="2228932"/>
+            <a:ext cx="1008569" cy="532038"/>
+          </a:xfrm>
+          <a:prstGeom prst="roundRect">
+            <a:avLst/>
+          </a:prstGeom>
+          <a:solidFill>
+            <a:srgbClr val="FF6F00"/>
+          </a:solidFill>
+          <a:ln>
+            <a:solidFill>
+              <a:srgbClr val="FF6F00"/>
+            </a:solidFill>
+          </a:ln>
+        </p:spPr>
+        <p:style>
+          <a:lnRef idx="2">
+            <a:schemeClr val="accent1">
+              <a:shade val="50000"/>
+            </a:schemeClr>
+          </a:lnRef>
+          <a:fillRef idx="1">
+            <a:schemeClr val="accent1"/>
+          </a:fillRef>
+          <a:effectRef idx="0">
+            <a:schemeClr val="accent1"/>
+          </a:effectRef>
+          <a:fontRef idx="minor">
+            <a:schemeClr val="lt1"/>
+          </a:fontRef>
+        </p:style>
+        <p:txBody>
+          <a:bodyPr rtlCol="0" anchor="ctr"/>
+          <a:lstStyle/>
+          <a:p>
+            <a:pPr algn="ctr"/>
+            <a:r>
+              <a:rPr lang="en-US" altLang="zh-CN" sz="1400" kern="100" dirty="0">
+                <a:solidFill>
+                  <a:schemeClr val="bg1"/>
+                </a:solidFill>
+                <a:latin typeface="Quicksand" pitchFamily="2" charset="0"/>
+                <a:ea typeface="宋体" panose="02010600030101010101" pitchFamily="2" charset="-122"/>
+                <a:cs typeface="Arial" panose="020B0604020202020204" pitchFamily="34" charset="0"/>
+              </a:rPr>
+              <a:t>Progress Bar</a:t>
+            </a:r>
+            <a:endParaRPr lang="zh-CN" altLang="zh-CN" sz="1400" kern="100" dirty="0">
+              <a:solidFill>
+                <a:schemeClr val="bg1"/>
+              </a:solidFill>
+              <a:effectLst/>
+              <a:latin typeface="Quicksand" pitchFamily="2" charset="0"/>
+              <a:ea typeface="宋体" panose="02010600030101010101" pitchFamily="2" charset="-122"/>
+              <a:cs typeface="Arial" panose="020B0604020202020204" pitchFamily="34" charset="0"/>
+            </a:endParaRPr>
+          </a:p>
+        </p:txBody>
+      </p:sp>
+      <p:sp>
+        <p:nvSpPr>
+          <p:cNvPr id="61" name="矩形: 圆角 60">
+            <a:extLst>
+              <a:ext uri="{FF2B5EF4-FFF2-40B4-BE49-F238E27FC236}">
+                <a16:creationId xmlns:a16="http://schemas.microsoft.com/office/drawing/2014/main" id="{D057B656-48B0-4A17-97F4-66837CCE81EB}"/>
+              </a:ext>
+            </a:extLst>
+          </p:cNvPr>
+          <p:cNvSpPr/>
+          <p:nvPr/>
+        </p:nvSpPr>
+        <p:spPr>
+          <a:xfrm>
+            <a:off x="3997274" y="1296793"/>
+            <a:ext cx="744462" cy="442640"/>
+          </a:xfrm>
+          <a:prstGeom prst="roundRect">
+            <a:avLst/>
+          </a:prstGeom>
+          <a:solidFill>
+            <a:srgbClr val="FF6F00"/>
+          </a:solidFill>
+          <a:ln>
+            <a:solidFill>
+              <a:srgbClr val="FF6F00"/>
+            </a:solidFill>
+          </a:ln>
+        </p:spPr>
+        <p:style>
+          <a:lnRef idx="2">
+            <a:schemeClr val="accent1">
+              <a:shade val="50000"/>
+            </a:schemeClr>
+          </a:lnRef>
+          <a:fillRef idx="1">
+            <a:schemeClr val="accent1"/>
+          </a:fillRef>
+          <a:effectRef idx="0">
+            <a:schemeClr val="accent1"/>
+          </a:effectRef>
+          <a:fontRef idx="minor">
+            <a:schemeClr val="lt1"/>
+          </a:fontRef>
+        </p:style>
+        <p:txBody>
+          <a:bodyPr rtlCol="0" anchor="ctr"/>
+          <a:lstStyle/>
+          <a:p>
+            <a:pPr algn="ctr"/>
+            <a:r>
+              <a:rPr lang="en-US" altLang="zh-CN" sz="1400" dirty="0">
+                <a:latin typeface="Quicksand" pitchFamily="2" charset="0"/>
+                <a:cs typeface="Arial" panose="020B0604020202020204" pitchFamily="34" charset="0"/>
+              </a:rPr>
+              <a:t>Entry</a:t>
+            </a:r>
+            <a:endParaRPr lang="zh-CN" altLang="en-US" sz="1400" dirty="0">
+              <a:latin typeface="Quicksand" pitchFamily="2" charset="0"/>
+              <a:cs typeface="Arial" panose="020B0604020202020204" pitchFamily="34" charset="0"/>
+            </a:endParaRPr>
+          </a:p>
+        </p:txBody>
+      </p:sp>
+      <p:sp>
+        <p:nvSpPr>
+          <p:cNvPr id="68" name="矩形: 圆角 67">
+            <a:extLst>
+              <a:ext uri="{FF2B5EF4-FFF2-40B4-BE49-F238E27FC236}">
+                <a16:creationId xmlns:a16="http://schemas.microsoft.com/office/drawing/2014/main" id="{4767E4C8-B385-4914-9BD3-119D030F6CAF}"/>
+              </a:ext>
+            </a:extLst>
+          </p:cNvPr>
+          <p:cNvSpPr/>
+          <p:nvPr/>
+        </p:nvSpPr>
+        <p:spPr>
+          <a:xfrm>
+            <a:off x="6490365" y="1066696"/>
+            <a:ext cx="1075430" cy="650927"/>
+          </a:xfrm>
+          <a:prstGeom prst="roundRect">
+            <a:avLst/>
+          </a:prstGeom>
+          <a:solidFill>
+            <a:srgbClr val="4CB050"/>
+          </a:solidFill>
+          <a:ln>
+            <a:noFill/>
+          </a:ln>
+        </p:spPr>
+        <p:style>
+          <a:lnRef idx="2">
+            <a:schemeClr val="accent1">
+              <a:shade val="50000"/>
+            </a:schemeClr>
+          </a:lnRef>
+          <a:fillRef idx="1">
+            <a:schemeClr val="accent1"/>
+          </a:fillRef>
+          <a:effectRef idx="0">
+            <a:schemeClr val="accent1"/>
+          </a:effectRef>
+          <a:fontRef idx="minor">
+            <a:schemeClr val="lt1"/>
+          </a:fontRef>
+        </p:style>
+        <p:txBody>
+          <a:bodyPr rtlCol="0" anchor="ctr"/>
+          <a:lstStyle/>
+          <a:p>
+            <a:pPr algn="ctr"/>
+            <a:r>
+              <a:rPr lang="en-US" altLang="zh-CN" sz="1400" dirty="0">
+                <a:latin typeface="Quicksand" pitchFamily="2" charset="0"/>
+                <a:cs typeface="Arial" panose="020B0604020202020204" pitchFamily="34" charset="0"/>
+              </a:rPr>
+              <a:t>Setting Button</a:t>
+            </a:r>
+            <a:endParaRPr lang="zh-CN" altLang="en-US" sz="1400" dirty="0">
+              <a:latin typeface="Quicksand" pitchFamily="2" charset="0"/>
+              <a:cs typeface="Arial" panose="020B0604020202020204" pitchFamily="34" charset="0"/>
+            </a:endParaRPr>
+          </a:p>
+        </p:txBody>
+      </p:sp>
+      <p:sp>
+        <p:nvSpPr>
+          <p:cNvPr id="69" name="矩形: 圆角 68">
+            <a:extLst>
+              <a:ext uri="{FF2B5EF4-FFF2-40B4-BE49-F238E27FC236}">
+                <a16:creationId xmlns:a16="http://schemas.microsoft.com/office/drawing/2014/main" id="{449F9EE7-94FF-47AB-81A3-67F7C161EEA1}"/>
+              </a:ext>
+            </a:extLst>
+          </p:cNvPr>
+          <p:cNvSpPr/>
+          <p:nvPr/>
+        </p:nvSpPr>
+        <p:spPr>
+          <a:xfrm>
+            <a:off x="9314425" y="1066696"/>
+            <a:ext cx="1075430" cy="650927"/>
+          </a:xfrm>
+          <a:prstGeom prst="roundRect">
+            <a:avLst/>
+          </a:prstGeom>
+          <a:solidFill>
+            <a:srgbClr val="4CB050"/>
+          </a:solidFill>
+          <a:ln>
+            <a:noFill/>
+          </a:ln>
+        </p:spPr>
+        <p:style>
+          <a:lnRef idx="2">
+            <a:schemeClr val="accent1">
+              <a:shade val="50000"/>
+            </a:schemeClr>
+          </a:lnRef>
+          <a:fillRef idx="1">
+            <a:schemeClr val="accent1"/>
+          </a:fillRef>
+          <a:effectRef idx="0">
+            <a:schemeClr val="accent1"/>
+          </a:effectRef>
+          <a:fontRef idx="minor">
+            <a:schemeClr val="lt1"/>
+          </a:fontRef>
+        </p:style>
+        <p:txBody>
+          <a:bodyPr rtlCol="0" anchor="ctr"/>
+          <a:lstStyle/>
+          <a:p>
+            <a:pPr algn="ctr"/>
+            <a:r>
+              <a:rPr lang="en-US" altLang="zh-CN" sz="1400" dirty="0">
+                <a:latin typeface="Quicksand" pitchFamily="2" charset="0"/>
+                <a:cs typeface="Arial" panose="020B0604020202020204" pitchFamily="34" charset="0"/>
+              </a:rPr>
+              <a:t>Help Button</a:t>
+            </a:r>
+            <a:endParaRPr lang="zh-CN" altLang="en-US" sz="1400" dirty="0">
+              <a:latin typeface="Quicksand" pitchFamily="2" charset="0"/>
+              <a:cs typeface="Arial" panose="020B0604020202020204" pitchFamily="34" charset="0"/>
+            </a:endParaRPr>
+          </a:p>
+        </p:txBody>
+      </p:sp>
+      <p:sp>
+        <p:nvSpPr>
+          <p:cNvPr id="70" name="矩形: 圆角 69">
+            <a:extLst>
+              <a:ext uri="{FF2B5EF4-FFF2-40B4-BE49-F238E27FC236}">
+                <a16:creationId xmlns:a16="http://schemas.microsoft.com/office/drawing/2014/main" id="{CFACBEE9-EBFA-4A9E-8C10-7F190E1641BC}"/>
+              </a:ext>
+            </a:extLst>
+          </p:cNvPr>
+          <p:cNvSpPr/>
+          <p:nvPr/>
+        </p:nvSpPr>
+        <p:spPr>
+          <a:xfrm>
+            <a:off x="2697869" y="5049695"/>
+            <a:ext cx="1075430" cy="650927"/>
+          </a:xfrm>
+          <a:prstGeom prst="roundRect">
+            <a:avLst/>
+          </a:prstGeom>
+          <a:solidFill>
+            <a:srgbClr val="4CB050"/>
+          </a:solidFill>
+          <a:ln>
+            <a:noFill/>
+          </a:ln>
+        </p:spPr>
+        <p:style>
+          <a:lnRef idx="2">
+            <a:schemeClr val="accent1">
+              <a:shade val="50000"/>
+            </a:schemeClr>
+          </a:lnRef>
+          <a:fillRef idx="1">
+            <a:schemeClr val="accent1"/>
+          </a:fillRef>
+          <a:effectRef idx="0">
+            <a:schemeClr val="accent1"/>
+          </a:effectRef>
+          <a:fontRef idx="minor">
+            <a:schemeClr val="lt1"/>
+          </a:fontRef>
+        </p:style>
+        <p:txBody>
+          <a:bodyPr rtlCol="0" anchor="ctr"/>
+          <a:lstStyle/>
+          <a:p>
+            <a:pPr algn="ctr"/>
+            <a:r>
+              <a:rPr lang="en-US" altLang="zh-CN" sz="1400" dirty="0">
+                <a:latin typeface="Quicksand" pitchFamily="2" charset="0"/>
+                <a:cs typeface="Arial" panose="020B0604020202020204" pitchFamily="34" charset="0"/>
+              </a:rPr>
+              <a:t>Section Menu</a:t>
+            </a:r>
+            <a:endParaRPr lang="zh-CN" altLang="en-US" sz="1400" dirty="0">
+              <a:latin typeface="Quicksand" pitchFamily="2" charset="0"/>
+              <a:cs typeface="Arial" panose="020B0604020202020204" pitchFamily="34" charset="0"/>
+            </a:endParaRPr>
+          </a:p>
+        </p:txBody>
+      </p:sp>
+      <p:cxnSp>
+        <p:nvCxnSpPr>
+          <p:cNvPr id="74" name="直接连接符 73">
+            <a:extLst>
+              <a:ext uri="{FF2B5EF4-FFF2-40B4-BE49-F238E27FC236}">
+                <a16:creationId xmlns:a16="http://schemas.microsoft.com/office/drawing/2014/main" id="{A303FF13-D17F-475C-8ECF-8CEC6C31C0E2}"/>
+              </a:ext>
+            </a:extLst>
+          </p:cNvPr>
+          <p:cNvCxnSpPr>
+            <a:cxnSpLocks/>
+          </p:cNvCxnSpPr>
+          <p:nvPr/>
+        </p:nvCxnSpPr>
+        <p:spPr>
+          <a:xfrm>
+            <a:off x="1447910" y="800059"/>
+            <a:ext cx="452193" cy="333757"/>
+          </a:xfrm>
+          <a:prstGeom prst="line">
+            <a:avLst/>
+          </a:prstGeom>
+          <a:ln>
+            <a:solidFill>
+              <a:srgbClr val="FF6F00"/>
+            </a:solidFill>
+          </a:ln>
+        </p:spPr>
+        <p:style>
+          <a:lnRef idx="1">
+            <a:schemeClr val="accent1"/>
+          </a:lnRef>
+          <a:fillRef idx="0">
+            <a:schemeClr val="accent1"/>
+          </a:fillRef>
+          <a:effectRef idx="0">
+            <a:schemeClr val="accent1"/>
+          </a:effectRef>
+          <a:fontRef idx="minor">
+            <a:schemeClr val="tx1"/>
+          </a:fontRef>
+        </p:style>
+      </p:cxnSp>
+      <p:cxnSp>
+        <p:nvCxnSpPr>
+          <p:cNvPr id="76" name="直接连接符 75">
+            <a:extLst>
+              <a:ext uri="{FF2B5EF4-FFF2-40B4-BE49-F238E27FC236}">
+                <a16:creationId xmlns:a16="http://schemas.microsoft.com/office/drawing/2014/main" id="{FDFFA724-B1E5-4BBA-87D6-E85F45FDCB47}"/>
+              </a:ext>
+            </a:extLst>
+          </p:cNvPr>
+          <p:cNvCxnSpPr>
+            <a:cxnSpLocks/>
+            <a:stCxn id="61" idx="1"/>
+          </p:cNvCxnSpPr>
+          <p:nvPr/>
+        </p:nvCxnSpPr>
+        <p:spPr>
+          <a:xfrm flipH="1">
+            <a:off x="3173747" y="1518113"/>
+            <a:ext cx="823527" cy="0"/>
+          </a:xfrm>
+          <a:prstGeom prst="line">
+            <a:avLst/>
+          </a:prstGeom>
+          <a:ln>
+            <a:solidFill>
+              <a:srgbClr val="FF6F00"/>
+            </a:solidFill>
+          </a:ln>
+        </p:spPr>
+        <p:style>
+          <a:lnRef idx="1">
+            <a:schemeClr val="accent1"/>
+          </a:lnRef>
+          <a:fillRef idx="0">
+            <a:schemeClr val="accent1"/>
+          </a:fillRef>
+          <a:effectRef idx="0">
+            <a:schemeClr val="accent1"/>
+          </a:effectRef>
+          <a:fontRef idx="minor">
+            <a:schemeClr val="tx1"/>
+          </a:fontRef>
+        </p:style>
+      </p:cxnSp>
+      <p:cxnSp>
+        <p:nvCxnSpPr>
+          <p:cNvPr id="78" name="直接连接符 77">
+            <a:extLst>
+              <a:ext uri="{FF2B5EF4-FFF2-40B4-BE49-F238E27FC236}">
+                <a16:creationId xmlns:a16="http://schemas.microsoft.com/office/drawing/2014/main" id="{D757547D-1F18-47BF-9DF4-E766206BD458}"/>
+              </a:ext>
+            </a:extLst>
+          </p:cNvPr>
+          <p:cNvCxnSpPr/>
+          <p:nvPr/>
+        </p:nvCxnSpPr>
+        <p:spPr>
+          <a:xfrm flipV="1">
+            <a:off x="1476920" y="2410926"/>
+            <a:ext cx="423183" cy="119970"/>
+          </a:xfrm>
+          <a:prstGeom prst="line">
+            <a:avLst/>
+          </a:prstGeom>
+          <a:ln>
+            <a:solidFill>
+              <a:srgbClr val="FF6F00"/>
+            </a:solidFill>
+          </a:ln>
+        </p:spPr>
+        <p:style>
+          <a:lnRef idx="1">
+            <a:schemeClr val="accent1"/>
+          </a:lnRef>
+          <a:fillRef idx="0">
+            <a:schemeClr val="accent1"/>
+          </a:fillRef>
+          <a:effectRef idx="0">
+            <a:schemeClr val="accent1"/>
+          </a:effectRef>
+          <a:fontRef idx="minor">
+            <a:schemeClr val="tx1"/>
+          </a:fontRef>
+        </p:style>
+      </p:cxnSp>
+      <p:cxnSp>
+        <p:nvCxnSpPr>
+          <p:cNvPr id="82" name="直接连接符 81">
+            <a:extLst>
+              <a:ext uri="{FF2B5EF4-FFF2-40B4-BE49-F238E27FC236}">
+                <a16:creationId xmlns:a16="http://schemas.microsoft.com/office/drawing/2014/main" id="{C17877E4-8FF5-400E-98BB-FDDDC568378B}"/>
+              </a:ext>
+            </a:extLst>
+          </p:cNvPr>
+          <p:cNvCxnSpPr>
+            <a:stCxn id="69" idx="1"/>
+          </p:cNvCxnSpPr>
+          <p:nvPr/>
+        </p:nvCxnSpPr>
+        <p:spPr>
+          <a:xfrm flipH="1">
+            <a:off x="8908664" y="1392160"/>
+            <a:ext cx="405761" cy="125954"/>
+          </a:xfrm>
+          <a:prstGeom prst="line">
+            <a:avLst/>
+          </a:prstGeom>
+          <a:ln>
+            <a:solidFill>
+              <a:srgbClr val="4CB050"/>
+            </a:solidFill>
+          </a:ln>
+        </p:spPr>
+        <p:style>
+          <a:lnRef idx="1">
+            <a:schemeClr val="accent1"/>
+          </a:lnRef>
+          <a:fillRef idx="0">
+            <a:schemeClr val="accent1"/>
+          </a:fillRef>
+          <a:effectRef idx="0">
+            <a:schemeClr val="accent1"/>
+          </a:effectRef>
+          <a:fontRef idx="minor">
+            <a:schemeClr val="tx1"/>
+          </a:fontRef>
+        </p:style>
+      </p:cxnSp>
+      <p:cxnSp>
+        <p:nvCxnSpPr>
+          <p:cNvPr id="84" name="直接连接符 83">
+            <a:extLst>
+              <a:ext uri="{FF2B5EF4-FFF2-40B4-BE49-F238E27FC236}">
+                <a16:creationId xmlns:a16="http://schemas.microsoft.com/office/drawing/2014/main" id="{E0F59047-D833-44B1-97E5-C68446308EA6}"/>
+              </a:ext>
+            </a:extLst>
+          </p:cNvPr>
+          <p:cNvCxnSpPr>
+            <a:cxnSpLocks/>
+            <a:stCxn id="70" idx="0"/>
+          </p:cNvCxnSpPr>
+          <p:nvPr/>
+        </p:nvCxnSpPr>
+        <p:spPr>
+          <a:xfrm flipH="1" flipV="1">
+            <a:off x="1476920" y="4356927"/>
+            <a:ext cx="1758664" cy="692768"/>
+          </a:xfrm>
+          <a:prstGeom prst="line">
+            <a:avLst/>
+          </a:prstGeom>
+          <a:ln>
+            <a:solidFill>
+              <a:srgbClr val="4CB050"/>
+            </a:solidFill>
+          </a:ln>
+        </p:spPr>
+        <p:style>
+          <a:lnRef idx="1">
+            <a:schemeClr val="accent1"/>
+          </a:lnRef>
+          <a:fillRef idx="0">
+            <a:schemeClr val="accent1"/>
+          </a:fillRef>
+          <a:effectRef idx="0">
+            <a:schemeClr val="accent1"/>
+          </a:effectRef>
+          <a:fontRef idx="minor">
+            <a:schemeClr val="tx1"/>
+          </a:fontRef>
+        </p:style>
+      </p:cxnSp>
+      <p:pic>
+        <p:nvPicPr>
+          <p:cNvPr id="13" name="图片 12">
+            <a:extLst>
+              <a:ext uri="{FF2B5EF4-FFF2-40B4-BE49-F238E27FC236}">
+                <a16:creationId xmlns:a16="http://schemas.microsoft.com/office/drawing/2014/main" id="{2D196EA8-F272-2140-8C70-ACEBF70E2F16}"/>
+              </a:ext>
+            </a:extLst>
+          </p:cNvPr>
+          <p:cNvPicPr>
+            <a:picLocks noChangeAspect="1"/>
+          </p:cNvPicPr>
+          <p:nvPr/>
+        </p:nvPicPr>
+        <p:blipFill>
+          <a:blip r:embed="rId3">
+            <a:extLst>
+              <a:ext uri="{28A0092B-C50C-407E-A947-70E740481C1C}">
+                <a14:useLocalDpi xmlns:a14="http://schemas.microsoft.com/office/drawing/2010/main" val="0"/>
+              </a:ext>
+            </a:extLst>
+          </a:blip>
+          <a:stretch>
+            <a:fillRect/>
+          </a:stretch>
+        </p:blipFill>
+        <p:spPr>
+          <a:xfrm>
+            <a:off x="468351" y="3710721"/>
+            <a:ext cx="6738257" cy="780296"/>
+          </a:xfrm>
+          <a:prstGeom prst="rect">
+            <a:avLst/>
+          </a:prstGeom>
+        </p:spPr>
+      </p:pic>
+      <p:pic>
+        <p:nvPicPr>
+          <p:cNvPr id="4" name="Picture 3">
+            <a:extLst>
+              <a:ext uri="{FF2B5EF4-FFF2-40B4-BE49-F238E27FC236}">
+                <a16:creationId xmlns:a16="http://schemas.microsoft.com/office/drawing/2014/main" id="{A8D7FCF5-C881-4568-8FFF-C9CFFE86BB8F}"/>
+              </a:ext>
+            </a:extLst>
+          </p:cNvPr>
+          <p:cNvPicPr>
+            <a:picLocks noChangeAspect="1"/>
+          </p:cNvPicPr>
+          <p:nvPr/>
+        </p:nvPicPr>
+        <p:blipFill>
+          <a:blip r:embed="rId4"/>
+          <a:stretch>
+            <a:fillRect/>
+          </a:stretch>
+        </p:blipFill>
+        <p:spPr>
+          <a:xfrm>
+            <a:off x="5579160" y="1199399"/>
+            <a:ext cx="685800" cy="657225"/>
+          </a:xfrm>
+          <a:prstGeom prst="rect">
+            <a:avLst/>
+          </a:prstGeom>
+        </p:spPr>
+      </p:pic>
+      <p:cxnSp>
+        <p:nvCxnSpPr>
+          <p:cNvPr id="80" name="直接连接符 79">
+            <a:extLst>
+              <a:ext uri="{FF2B5EF4-FFF2-40B4-BE49-F238E27FC236}">
+                <a16:creationId xmlns:a16="http://schemas.microsoft.com/office/drawing/2014/main" id="{02523D7A-533C-43D9-B6BA-AE72135FA8CB}"/>
+              </a:ext>
+            </a:extLst>
+          </p:cNvPr>
+          <p:cNvCxnSpPr>
+            <a:cxnSpLocks/>
+            <a:stCxn id="68" idx="1"/>
+          </p:cNvCxnSpPr>
+          <p:nvPr/>
+        </p:nvCxnSpPr>
+        <p:spPr>
+          <a:xfrm flipH="1">
+            <a:off x="6145731" y="1392160"/>
+            <a:ext cx="344634" cy="125953"/>
+          </a:xfrm>
+          <a:prstGeom prst="line">
+            <a:avLst/>
+          </a:prstGeom>
+          <a:ln>
+            <a:solidFill>
+              <a:srgbClr val="4CB050"/>
+            </a:solidFill>
+          </a:ln>
+        </p:spPr>
+        <p:style>
+          <a:lnRef idx="1">
+            <a:schemeClr val="accent1"/>
+          </a:lnRef>
+          <a:fillRef idx="0">
+            <a:schemeClr val="accent1"/>
+          </a:fillRef>
+          <a:effectRef idx="0">
+            <a:schemeClr val="accent1"/>
+          </a:effectRef>
+          <a:fontRef idx="minor">
+            <a:schemeClr val="tx1"/>
+          </a:fontRef>
+        </p:style>
+      </p:cxnSp>
+      <p:pic>
+        <p:nvPicPr>
+          <p:cNvPr id="10" name="Picture 9">
+            <a:extLst>
+              <a:ext uri="{FF2B5EF4-FFF2-40B4-BE49-F238E27FC236}">
+                <a16:creationId xmlns:a16="http://schemas.microsoft.com/office/drawing/2014/main" id="{003116F8-2180-4024-B169-675E483B7207}"/>
+              </a:ext>
+            </a:extLst>
+          </p:cNvPr>
+          <p:cNvPicPr>
+            <a:picLocks noChangeAspect="1"/>
+          </p:cNvPicPr>
+          <p:nvPr/>
+        </p:nvPicPr>
+        <p:blipFill>
+          <a:blip r:embed="rId5"/>
+          <a:stretch>
+            <a:fillRect/>
+          </a:stretch>
+        </p:blipFill>
+        <p:spPr>
+          <a:xfrm>
+            <a:off x="8389621" y="1247023"/>
+            <a:ext cx="552450" cy="561975"/>
+          </a:xfrm>
+          <a:prstGeom prst="rect">
+            <a:avLst/>
+          </a:prstGeom>
+        </p:spPr>
+      </p:pic>
+    </p:spTree>
+    <p:extLst>
+      <p:ext uri="{BB962C8B-B14F-4D97-AF65-F5344CB8AC3E}">
+        <p14:creationId xmlns:p14="http://schemas.microsoft.com/office/powerpoint/2010/main" val="3624331459"/>
+      </p:ext>
+    </p:extLst>
+  </p:cSld>
+  <p:clrMapOvr>
+    <a:masterClrMapping/>
+  </p:clrMapOvr>
+</p:sld>
+</file>
+
+<file path=ppt/slides/slide5.xml><?xml version="1.0" encoding="utf-8"?>
 <p:sld xmlns:a="http://schemas.openxmlformats.org/drawingml/2006/main" xmlns:r="http://schemas.openxmlformats.org/officeDocument/2006/relationships" xmlns:p="http://schemas.openxmlformats.org/presentationml/2006/main">
   <p:cSld>
     <p:spTree>

</xml_diff>